<commit_message>
Added content to php basics lection
</commit_message>
<xml_diff>
--- a/04.php-basics.pptx
+++ b/04.php-basics.pptx
@@ -8,6 +8,9 @@
     <p:sldId id="256" r:id="rId2"/>
     <p:sldId id="257" r:id="rId3"/>
     <p:sldId id="258" r:id="rId4"/>
+    <p:sldId id="259" r:id="rId5"/>
+    <p:sldId id="260" r:id="rId6"/>
+    <p:sldId id="261" r:id="rId7"/>
   </p:sldIdLst>
   <p:sldSz cx="12192000" cy="6858000"/>
   <p:notesSz cx="6858000" cy="9144000"/>
@@ -285,7 +288,7 @@
           <a:p>
             <a:fld id="{8B1F5485-5187-459B-B3E0-6B07363DEE3D}" type="datetimeFigureOut">
               <a:rPr lang="en-US" smtClean="0"/>
-              <a:t>11/18/2014</a:t>
+              <a:t>11/19/2014</a:t>
             </a:fld>
             <a:endParaRPr lang="en-US"/>
           </a:p>
@@ -597,7 +600,7 @@
           <a:p>
             <a:fld id="{8B1F5485-5187-459B-B3E0-6B07363DEE3D}" type="datetimeFigureOut">
               <a:rPr lang="en-US" smtClean="0"/>
-              <a:t>11/18/2014</a:t>
+              <a:t>11/19/2014</a:t>
             </a:fld>
             <a:endParaRPr lang="en-US"/>
           </a:p>
@@ -819,7 +822,7 @@
           <a:p>
             <a:fld id="{8B1F5485-5187-459B-B3E0-6B07363DEE3D}" type="datetimeFigureOut">
               <a:rPr lang="en-US" smtClean="0"/>
-              <a:t>11/18/2014</a:t>
+              <a:t>11/19/2014</a:t>
             </a:fld>
             <a:endParaRPr lang="en-US"/>
           </a:p>
@@ -1110,7 +1113,7 @@
           <a:p>
             <a:fld id="{8B1F5485-5187-459B-B3E0-6B07363DEE3D}" type="datetimeFigureOut">
               <a:rPr lang="en-US" smtClean="0"/>
-              <a:t>11/18/2014</a:t>
+              <a:t>11/19/2014</a:t>
             </a:fld>
             <a:endParaRPr lang="en-US"/>
           </a:p>
@@ -1564,7 +1567,7 @@
           <a:p>
             <a:fld id="{8B1F5485-5187-459B-B3E0-6B07363DEE3D}" type="datetimeFigureOut">
               <a:rPr lang="en-US" smtClean="0"/>
-              <a:t>11/18/2014</a:t>
+              <a:t>11/19/2014</a:t>
             </a:fld>
             <a:endParaRPr lang="en-US"/>
           </a:p>
@@ -2140,7 +2143,7 @@
           <a:p>
             <a:fld id="{8B1F5485-5187-459B-B3E0-6B07363DEE3D}" type="datetimeFigureOut">
               <a:rPr lang="en-US" smtClean="0"/>
-              <a:t>11/18/2014</a:t>
+              <a:t>11/19/2014</a:t>
             </a:fld>
             <a:endParaRPr lang="en-US"/>
           </a:p>
@@ -2992,7 +2995,7 @@
           <a:p>
             <a:fld id="{8B1F5485-5187-459B-B3E0-6B07363DEE3D}" type="datetimeFigureOut">
               <a:rPr lang="en-US" smtClean="0"/>
-              <a:t>11/18/2014</a:t>
+              <a:t>11/19/2014</a:t>
             </a:fld>
             <a:endParaRPr lang="en-US"/>
           </a:p>
@@ -3197,7 +3200,7 @@
           <a:p>
             <a:fld id="{8B1F5485-5187-459B-B3E0-6B07363DEE3D}" type="datetimeFigureOut">
               <a:rPr lang="en-US" smtClean="0"/>
-              <a:t>11/18/2014</a:t>
+              <a:t>11/19/2014</a:t>
             </a:fld>
             <a:endParaRPr lang="en-US"/>
           </a:p>
@@ -3411,7 +3414,7 @@
           <a:p>
             <a:fld id="{8B1F5485-5187-459B-B3E0-6B07363DEE3D}" type="datetimeFigureOut">
               <a:rPr lang="en-US" smtClean="0"/>
-              <a:t>11/18/2014</a:t>
+              <a:t>11/19/2014</a:t>
             </a:fld>
             <a:endParaRPr lang="en-US"/>
           </a:p>
@@ -3616,7 +3619,7 @@
           <a:p>
             <a:fld id="{8B1F5485-5187-459B-B3E0-6B07363DEE3D}" type="datetimeFigureOut">
               <a:rPr lang="en-US" smtClean="0"/>
-              <a:t>11/18/2014</a:t>
+              <a:t>11/19/2014</a:t>
             </a:fld>
             <a:endParaRPr lang="en-US"/>
           </a:p>
@@ -3896,7 +3899,7 @@
           <a:p>
             <a:fld id="{8B1F5485-5187-459B-B3E0-6B07363DEE3D}" type="datetimeFigureOut">
               <a:rPr lang="en-US" smtClean="0"/>
-              <a:t>11/18/2014</a:t>
+              <a:t>11/19/2014</a:t>
             </a:fld>
             <a:endParaRPr lang="en-US"/>
           </a:p>
@@ -4163,7 +4166,7 @@
           <a:p>
             <a:fld id="{8B1F5485-5187-459B-B3E0-6B07363DEE3D}" type="datetimeFigureOut">
               <a:rPr lang="en-US" smtClean="0"/>
-              <a:t>11/18/2014</a:t>
+              <a:t>11/19/2014</a:t>
             </a:fld>
             <a:endParaRPr lang="en-US"/>
           </a:p>
@@ -4578,7 +4581,7 @@
           <a:p>
             <a:fld id="{8B1F5485-5187-459B-B3E0-6B07363DEE3D}" type="datetimeFigureOut">
               <a:rPr lang="en-US" smtClean="0"/>
-              <a:t>11/18/2014</a:t>
+              <a:t>11/19/2014</a:t>
             </a:fld>
             <a:endParaRPr lang="en-US"/>
           </a:p>
@@ -4726,7 +4729,7 @@
           <a:p>
             <a:fld id="{8B1F5485-5187-459B-B3E0-6B07363DEE3D}" type="datetimeFigureOut">
               <a:rPr lang="en-US" smtClean="0"/>
-              <a:t>11/18/2014</a:t>
+              <a:t>11/19/2014</a:t>
             </a:fld>
             <a:endParaRPr lang="en-US"/>
           </a:p>
@@ -4851,7 +4854,7 @@
           <a:p>
             <a:fld id="{8B1F5485-5187-459B-B3E0-6B07363DEE3D}" type="datetimeFigureOut">
               <a:rPr lang="en-US" smtClean="0"/>
-              <a:t>11/18/2014</a:t>
+              <a:t>11/19/2014</a:t>
             </a:fld>
             <a:endParaRPr lang="en-US"/>
           </a:p>
@@ -5130,7 +5133,7 @@
           <a:p>
             <a:fld id="{8B1F5485-5187-459B-B3E0-6B07363DEE3D}" type="datetimeFigureOut">
               <a:rPr lang="en-US" smtClean="0"/>
-              <a:t>11/18/2014</a:t>
+              <a:t>11/19/2014</a:t>
             </a:fld>
             <a:endParaRPr lang="en-US"/>
           </a:p>
@@ -5442,7 +5445,7 @@
           <a:p>
             <a:fld id="{8B1F5485-5187-459B-B3E0-6B07363DEE3D}" type="datetimeFigureOut">
               <a:rPr lang="en-US" smtClean="0"/>
-              <a:t>11/18/2014</a:t>
+              <a:t>11/19/2014</a:t>
             </a:fld>
             <a:endParaRPr lang="en-US"/>
           </a:p>
@@ -5695,7 +5698,7 @@
           <a:p>
             <a:fld id="{8B1F5485-5187-459B-B3E0-6B07363DEE3D}" type="datetimeFigureOut">
               <a:rPr lang="en-US" smtClean="0"/>
-              <a:t>11/18/2014</a:t>
+              <a:t>11/19/2014</a:t>
             </a:fld>
             <a:endParaRPr lang="en-US"/>
           </a:p>
@@ -6261,31 +6264,12 @@
           </a:p>
           <a:p>
             <a:r>
-              <a:rPr lang="bg-BG" dirty="0" err="1" smtClean="0"/>
-              <a:t>СЪздава</a:t>
-            </a:r>
-            <a:r>
               <a:rPr lang="bg-BG" dirty="0" smtClean="0"/>
-              <a:t> </a:t>
-            </a:r>
-            <a:r>
-              <a:rPr lang="bg-BG" dirty="0" err="1" smtClean="0"/>
-              <a:t>динамичко</a:t>
+              <a:t>Осигурява </a:t>
             </a:r>
             <a:r>
               <a:rPr lang="bg-BG" dirty="0" smtClean="0"/>
-              <a:t> </a:t>
-            </a:r>
-            <a:r>
-              <a:rPr lang="en-US" dirty="0" smtClean="0"/>
-              <a:t>HTML</a:t>
-            </a:r>
-            <a:endParaRPr lang="bg-BG" dirty="0" smtClean="0"/>
-          </a:p>
-          <a:p>
-            <a:r>
-              <a:rPr lang="bg-BG" dirty="0" smtClean="0"/>
-              <a:t>Осигурява връзка с база данни</a:t>
+              <a:t>връзка с база данни</a:t>
             </a:r>
           </a:p>
           <a:p>
@@ -6295,8 +6279,46 @@
             </a:r>
             <a:r>
               <a:rPr lang="en-US" dirty="0" smtClean="0"/>
-              <a:t>web server (apache, engine x)</a:t>
-            </a:r>
+              <a:t>web server (apache, engine x</a:t>
+            </a:r>
+            <a:r>
+              <a:rPr lang="en-US" dirty="0" smtClean="0"/>
+              <a:t>)</a:t>
+            </a:r>
+          </a:p>
+          <a:p>
+            <a:r>
+              <a:rPr lang="bg-BG" dirty="0" smtClean="0"/>
+              <a:t>Изпълнява се заедно с </a:t>
+            </a:r>
+            <a:r>
+              <a:rPr lang="en-US" dirty="0" smtClean="0"/>
+              <a:t>html</a:t>
+            </a:r>
+          </a:p>
+          <a:p>
+            <a:r>
+              <a:rPr lang="bg-BG" dirty="0" err="1"/>
+              <a:t>СЪздава</a:t>
+            </a:r>
+            <a:r>
+              <a:rPr lang="bg-BG" dirty="0"/>
+              <a:t> </a:t>
+            </a:r>
+            <a:r>
+              <a:rPr lang="bg-BG" dirty="0" smtClean="0"/>
+              <a:t>динамично </a:t>
+            </a:r>
+            <a:r>
+              <a:rPr lang="en-US" dirty="0"/>
+              <a:t>HTML</a:t>
+            </a:r>
+            <a:endParaRPr lang="bg-BG" dirty="0"/>
+          </a:p>
+          <a:p>
+            <a:pPr marL="0" indent="0">
+              <a:buNone/>
+            </a:pPr>
             <a:endParaRPr lang="bg-BG" dirty="0" smtClean="0"/>
           </a:p>
           <a:p>
@@ -6349,33 +6371,491 @@
           <a:bodyPr/>
           <a:lstStyle/>
           <a:p>
-            <a:endParaRPr lang="en-US"/>
-          </a:p>
-        </p:txBody>
-      </p:sp>
-      <p:sp>
-        <p:nvSpPr>
-          <p:cNvPr id="3" name="Content Placeholder 2"/>
-          <p:cNvSpPr>
-            <a:spLocks noGrp="1"/>
-          </p:cNvSpPr>
-          <p:nvPr>
-            <p:ph sz="quarter" idx="13"/>
-          </p:nvPr>
-        </p:nvSpPr>
-        <p:spPr/>
-        <p:txBody>
-          <a:bodyPr/>
-          <a:lstStyle/>
-          <a:p>
-            <a:endParaRPr lang="en-US"/>
-          </a:p>
-        </p:txBody>
-      </p:sp>
+            <a:r>
+              <a:rPr lang="en-US" dirty="0" smtClean="0"/>
+              <a:t>PHP Hello World</a:t>
+            </a:r>
+            <a:r>
+              <a:rPr lang="bg-BG" dirty="0" smtClean="0"/>
+              <a:t> </a:t>
+            </a:r>
+            <a:r>
+              <a:rPr lang="bg-BG" dirty="0" err="1" smtClean="0"/>
+              <a:t>ДЕМо</a:t>
+            </a:r>
+            <a:endParaRPr lang="en-US" dirty="0"/>
+          </a:p>
+        </p:txBody>
+      </p:sp>
+      <p:pic>
+        <p:nvPicPr>
+          <p:cNvPr id="1026" name="Picture 2" descr="http://www.tutorialesfacil.com.ar/GraficosdeInstalacion/800px-PHP-n_logo.svg.png"/>
+          <p:cNvPicPr>
+            <a:picLocks noChangeAspect="1" noChangeArrowheads="1"/>
+          </p:cNvPicPr>
+          <p:nvPr/>
+        </p:nvPicPr>
+        <p:blipFill>
+          <a:blip r:embed="rId2">
+            <a:extLst>
+              <a:ext uri="{28A0092B-C50C-407E-A947-70E740481C1C}">
+                <a14:useLocalDpi xmlns:a14="http://schemas.microsoft.com/office/drawing/2010/main" val="0"/>
+              </a:ext>
+            </a:extLst>
+          </a:blip>
+          <a:srcRect/>
+          <a:stretch>
+            <a:fillRect/>
+          </a:stretch>
+        </p:blipFill>
+        <p:spPr bwMode="auto">
+          <a:xfrm>
+            <a:off x="2286000" y="2382745"/>
+            <a:ext cx="7620000" cy="4010026"/>
+          </a:xfrm>
+          <a:prstGeom prst="rect">
+            <a:avLst/>
+          </a:prstGeom>
+          <a:noFill/>
+          <a:extLst>
+            <a:ext uri="{909E8E84-426E-40DD-AFC4-6F175D3DCCD1}">
+              <a14:hiddenFill xmlns:a14="http://schemas.microsoft.com/office/drawing/2010/main">
+                <a:solidFill>
+                  <a:srgbClr val="FFFFFF"/>
+                </a:solidFill>
+              </a14:hiddenFill>
+            </a:ext>
+          </a:extLst>
+        </p:spPr>
+      </p:pic>
     </p:spTree>
     <p:extLst>
       <p:ext uri="{BB962C8B-B14F-4D97-AF65-F5344CB8AC3E}">
         <p14:creationId xmlns:p14="http://schemas.microsoft.com/office/powerpoint/2010/main" val="3399742131"/>
+      </p:ext>
+    </p:extLst>
+  </p:cSld>
+  <p:clrMapOvr>
+    <a:masterClrMapping/>
+  </p:clrMapOvr>
+</p:sld>
+</file>
+
+<file path=ppt/slides/slide4.xml><?xml version="1.0" encoding="utf-8"?>
+<p:sld xmlns:a="http://schemas.openxmlformats.org/drawingml/2006/main" xmlns:r="http://schemas.openxmlformats.org/officeDocument/2006/relationships" xmlns:p="http://schemas.openxmlformats.org/presentationml/2006/main">
+  <p:cSld>
+    <p:spTree>
+      <p:nvGrpSpPr>
+        <p:cNvPr id="1" name=""/>
+        <p:cNvGrpSpPr/>
+        <p:nvPr/>
+      </p:nvGrpSpPr>
+      <p:grpSpPr>
+        <a:xfrm>
+          <a:off x="0" y="0"/>
+          <a:ext cx="0" cy="0"/>
+          <a:chOff x="0" y="0"/>
+          <a:chExt cx="0" cy="0"/>
+        </a:xfrm>
+      </p:grpSpPr>
+      <p:sp>
+        <p:nvSpPr>
+          <p:cNvPr id="2" name="Title 1"/>
+          <p:cNvSpPr>
+            <a:spLocks noGrp="1"/>
+          </p:cNvSpPr>
+          <p:nvPr>
+            <p:ph type="title"/>
+          </p:nvPr>
+        </p:nvSpPr>
+        <p:spPr/>
+        <p:txBody>
+          <a:bodyPr/>
+          <a:lstStyle/>
+          <a:p>
+            <a:r>
+              <a:rPr lang="bg-BG" dirty="0" smtClean="0"/>
+              <a:t>Какво е </a:t>
+            </a:r>
+            <a:r>
+              <a:rPr lang="en-US" dirty="0" smtClean="0"/>
+              <a:t>web Server</a:t>
+            </a:r>
+            <a:endParaRPr lang="en-US" dirty="0"/>
+          </a:p>
+        </p:txBody>
+      </p:sp>
+      <p:sp>
+        <p:nvSpPr>
+          <p:cNvPr id="3" name="Content Placeholder 2"/>
+          <p:cNvSpPr>
+            <a:spLocks noGrp="1"/>
+          </p:cNvSpPr>
+          <p:nvPr>
+            <p:ph sz="quarter" idx="13"/>
+          </p:nvPr>
+        </p:nvSpPr>
+        <p:spPr/>
+        <p:txBody>
+          <a:bodyPr/>
+          <a:lstStyle/>
+          <a:p>
+            <a:r>
+              <a:rPr lang="bg-BG" dirty="0" smtClean="0"/>
+              <a:t>Програма която приема </a:t>
+            </a:r>
+            <a:r>
+              <a:rPr lang="en-US" dirty="0" smtClean="0"/>
+              <a:t>HTTP Requests</a:t>
+            </a:r>
+          </a:p>
+          <a:p>
+            <a:r>
+              <a:rPr lang="bg-BG" dirty="0" smtClean="0"/>
+              <a:t>интерпретира </a:t>
+            </a:r>
+            <a:r>
+              <a:rPr lang="en-US" dirty="0" err="1" smtClean="0"/>
+              <a:t>php</a:t>
+            </a:r>
+            <a:r>
+              <a:rPr lang="en-US" dirty="0" smtClean="0"/>
+              <a:t> </a:t>
+            </a:r>
+            <a:r>
+              <a:rPr lang="bg-BG" dirty="0" smtClean="0"/>
+              <a:t>документи и на тяхна база връща </a:t>
+            </a:r>
+            <a:r>
+              <a:rPr lang="en-US" dirty="0" smtClean="0"/>
+              <a:t>response</a:t>
+            </a:r>
+          </a:p>
+          <a:p>
+            <a:r>
+              <a:rPr lang="en-US" dirty="0" smtClean="0"/>
+              <a:t>Apache </a:t>
+            </a:r>
+          </a:p>
+          <a:p>
+            <a:r>
+              <a:rPr lang="bg-BG" dirty="0" smtClean="0"/>
+              <a:t>Какво е </a:t>
+            </a:r>
+            <a:r>
+              <a:rPr lang="en-US" dirty="0" err="1" smtClean="0"/>
+              <a:t>XAMpp</a:t>
+            </a:r>
+            <a:endParaRPr lang="en-US" dirty="0" smtClean="0"/>
+          </a:p>
+          <a:p>
+            <a:endParaRPr lang="bg-BG" dirty="0" smtClean="0"/>
+          </a:p>
+          <a:p>
+            <a:endParaRPr lang="en-US" dirty="0"/>
+          </a:p>
+        </p:txBody>
+      </p:sp>
+    </p:spTree>
+    <p:extLst>
+      <p:ext uri="{BB962C8B-B14F-4D97-AF65-F5344CB8AC3E}">
+        <p14:creationId xmlns:p14="http://schemas.microsoft.com/office/powerpoint/2010/main" val="2468890724"/>
+      </p:ext>
+    </p:extLst>
+  </p:cSld>
+  <p:clrMapOvr>
+    <a:masterClrMapping/>
+  </p:clrMapOvr>
+</p:sld>
+</file>
+
+<file path=ppt/slides/slide5.xml><?xml version="1.0" encoding="utf-8"?>
+<p:sld xmlns:a="http://schemas.openxmlformats.org/drawingml/2006/main" xmlns:r="http://schemas.openxmlformats.org/officeDocument/2006/relationships" xmlns:p="http://schemas.openxmlformats.org/presentationml/2006/main">
+  <p:cSld>
+    <p:spTree>
+      <p:nvGrpSpPr>
+        <p:cNvPr id="1" name=""/>
+        <p:cNvGrpSpPr/>
+        <p:nvPr/>
+      </p:nvGrpSpPr>
+      <p:grpSpPr>
+        <a:xfrm>
+          <a:off x="0" y="0"/>
+          <a:ext cx="0" cy="0"/>
+          <a:chOff x="0" y="0"/>
+          <a:chExt cx="0" cy="0"/>
+        </a:xfrm>
+      </p:grpSpPr>
+      <p:sp>
+        <p:nvSpPr>
+          <p:cNvPr id="2" name="Title 1"/>
+          <p:cNvSpPr>
+            <a:spLocks noGrp="1"/>
+          </p:cNvSpPr>
+          <p:nvPr>
+            <p:ph type="title"/>
+          </p:nvPr>
+        </p:nvSpPr>
+        <p:spPr>
+          <a:xfrm>
+            <a:off x="913775" y="618517"/>
+            <a:ext cx="10364451" cy="1001277"/>
+          </a:xfrm>
+        </p:spPr>
+        <p:txBody>
+          <a:bodyPr/>
+          <a:lstStyle/>
+          <a:p>
+            <a:r>
+              <a:rPr lang="en-US" dirty="0" smtClean="0"/>
+              <a:t>Web server</a:t>
+            </a:r>
+            <a:r>
+              <a:rPr lang="bg-BG" dirty="0" smtClean="0"/>
+              <a:t> илюстрация</a:t>
+            </a:r>
+            <a:endParaRPr lang="en-US" dirty="0"/>
+          </a:p>
+        </p:txBody>
+      </p:sp>
+      <p:pic>
+        <p:nvPicPr>
+          <p:cNvPr id="2050" name="Picture 2" descr="http://phpmysqllearners.files.wordpress.com/2014/01/how-php-works1.jpg"/>
+          <p:cNvPicPr>
+            <a:picLocks noChangeAspect="1" noChangeArrowheads="1"/>
+          </p:cNvPicPr>
+          <p:nvPr/>
+        </p:nvPicPr>
+        <p:blipFill>
+          <a:blip r:embed="rId2">
+            <a:extLst>
+              <a:ext uri="{28A0092B-C50C-407E-A947-70E740481C1C}">
+                <a14:useLocalDpi xmlns:a14="http://schemas.microsoft.com/office/drawing/2010/main" val="0"/>
+              </a:ext>
+            </a:extLst>
+          </a:blip>
+          <a:srcRect/>
+          <a:stretch>
+            <a:fillRect/>
+          </a:stretch>
+        </p:blipFill>
+        <p:spPr bwMode="auto">
+          <a:xfrm>
+            <a:off x="3125787" y="2214694"/>
+            <a:ext cx="5940426" cy="4312469"/>
+          </a:xfrm>
+          <a:prstGeom prst="rect">
+            <a:avLst/>
+          </a:prstGeom>
+          <a:noFill/>
+          <a:extLst>
+            <a:ext uri="{909E8E84-426E-40DD-AFC4-6F175D3DCCD1}">
+              <a14:hiddenFill xmlns:a14="http://schemas.microsoft.com/office/drawing/2010/main">
+                <a:solidFill>
+                  <a:srgbClr val="FFFFFF"/>
+                </a:solidFill>
+              </a14:hiddenFill>
+            </a:ext>
+          </a:extLst>
+        </p:spPr>
+      </p:pic>
+    </p:spTree>
+    <p:extLst>
+      <p:ext uri="{BB962C8B-B14F-4D97-AF65-F5344CB8AC3E}">
+        <p14:creationId xmlns:p14="http://schemas.microsoft.com/office/powerpoint/2010/main" val="1566089602"/>
+      </p:ext>
+    </p:extLst>
+  </p:cSld>
+  <p:clrMapOvr>
+    <a:masterClrMapping/>
+  </p:clrMapOvr>
+</p:sld>
+</file>
+
+<file path=ppt/slides/slide6.xml><?xml version="1.0" encoding="utf-8"?>
+<p:sld xmlns:a="http://schemas.openxmlformats.org/drawingml/2006/main" xmlns:r="http://schemas.openxmlformats.org/officeDocument/2006/relationships" xmlns:p="http://schemas.openxmlformats.org/presentationml/2006/main">
+  <p:cSld>
+    <p:spTree>
+      <p:nvGrpSpPr>
+        <p:cNvPr id="1" name=""/>
+        <p:cNvGrpSpPr/>
+        <p:nvPr/>
+      </p:nvGrpSpPr>
+      <p:grpSpPr>
+        <a:xfrm>
+          <a:off x="0" y="0"/>
+          <a:ext cx="0" cy="0"/>
+          <a:chOff x="0" y="0"/>
+          <a:chExt cx="0" cy="0"/>
+        </a:xfrm>
+      </p:grpSpPr>
+      <p:sp>
+        <p:nvSpPr>
+          <p:cNvPr id="2" name="Title 1"/>
+          <p:cNvSpPr>
+            <a:spLocks noGrp="1"/>
+          </p:cNvSpPr>
+          <p:nvPr>
+            <p:ph type="title"/>
+          </p:nvPr>
+        </p:nvSpPr>
+        <p:spPr/>
+        <p:txBody>
+          <a:bodyPr/>
+          <a:lstStyle/>
+          <a:p>
+            <a:r>
+              <a:rPr lang="en-US" dirty="0" err="1" smtClean="0"/>
+              <a:t>Php</a:t>
+            </a:r>
+            <a:r>
+              <a:rPr lang="en-US" dirty="0" smtClean="0"/>
+              <a:t> </a:t>
+            </a:r>
+            <a:r>
+              <a:rPr lang="bg-BG" dirty="0" smtClean="0"/>
+              <a:t>синтаксис</a:t>
+            </a:r>
+            <a:endParaRPr lang="en-US" dirty="0"/>
+          </a:p>
+        </p:txBody>
+      </p:sp>
+      <p:sp>
+        <p:nvSpPr>
+          <p:cNvPr id="3" name="Content Placeholder 2"/>
+          <p:cNvSpPr>
+            <a:spLocks noGrp="1"/>
+          </p:cNvSpPr>
+          <p:nvPr>
+            <p:ph sz="quarter" idx="13"/>
+          </p:nvPr>
+        </p:nvSpPr>
+        <p:spPr/>
+        <p:txBody>
+          <a:bodyPr/>
+          <a:lstStyle/>
+          <a:p>
+            <a:r>
+              <a:rPr lang="en-US" dirty="0" err="1" smtClean="0"/>
+              <a:t>Php</a:t>
+            </a:r>
+            <a:r>
+              <a:rPr lang="en-US" dirty="0" smtClean="0"/>
+              <a:t> </a:t>
+            </a:r>
+            <a:r>
+              <a:rPr lang="bg-BG" dirty="0" smtClean="0"/>
+              <a:t>код винаги започва с </a:t>
+            </a:r>
+            <a:r>
+              <a:rPr lang="en-US" dirty="0"/>
+              <a:t>&lt;?</a:t>
+            </a:r>
+            <a:r>
+              <a:rPr lang="en-US" dirty="0" err="1"/>
+              <a:t>php</a:t>
+            </a:r>
+            <a:r>
+              <a:rPr lang="en-US" dirty="0"/>
+              <a:t> </a:t>
+            </a:r>
+            <a:r>
+              <a:rPr lang="bg-BG" dirty="0" smtClean="0"/>
+              <a:t>и завършва с </a:t>
+            </a:r>
+            <a:r>
+              <a:rPr lang="en-US" dirty="0"/>
+              <a:t>?&gt;</a:t>
+            </a:r>
+          </a:p>
+          <a:p>
+            <a:r>
+              <a:rPr lang="bg-BG" dirty="0" smtClean="0"/>
+              <a:t>Съкратен </a:t>
+            </a:r>
+            <a:r>
+              <a:rPr lang="en-US" dirty="0" err="1" smtClean="0"/>
+              <a:t>php</a:t>
+            </a:r>
+            <a:r>
+              <a:rPr lang="en-US" dirty="0" smtClean="0"/>
+              <a:t> </a:t>
+            </a:r>
+            <a:r>
+              <a:rPr lang="bg-BG" dirty="0" smtClean="0"/>
+              <a:t>синтаксис</a:t>
+            </a:r>
+            <a:r>
+              <a:rPr lang="en-US" dirty="0" smtClean="0"/>
+              <a:t> – </a:t>
+            </a:r>
+            <a:r>
+              <a:rPr lang="en-US" dirty="0" err="1" smtClean="0"/>
+              <a:t>php</a:t>
+            </a:r>
+            <a:r>
+              <a:rPr lang="en-US" dirty="0" smtClean="0"/>
+              <a:t> </a:t>
+            </a:r>
+            <a:r>
+              <a:rPr lang="bg-BG" dirty="0" smtClean="0"/>
+              <a:t>код започва с </a:t>
+            </a:r>
+            <a:r>
+              <a:rPr lang="en-US" dirty="0" smtClean="0"/>
+              <a:t>&lt;?</a:t>
+            </a:r>
+            <a:endParaRPr lang="bg-BG" dirty="0" smtClean="0"/>
+          </a:p>
+          <a:p>
+            <a:r>
+              <a:rPr lang="bg-BG" dirty="0" smtClean="0"/>
+              <a:t>Синтаксиса е </a:t>
+            </a:r>
+            <a:r>
+              <a:rPr lang="bg-BG" dirty="0" err="1" smtClean="0"/>
+              <a:t>илеснен</a:t>
+            </a:r>
+            <a:endParaRPr lang="bg-BG" dirty="0" smtClean="0"/>
+          </a:p>
+          <a:p>
+            <a:r>
+              <a:rPr lang="bg-BG" dirty="0" smtClean="0"/>
+              <a:t>Синтаксиса е подобен на </a:t>
+            </a:r>
+            <a:r>
+              <a:rPr lang="en-US" dirty="0" smtClean="0"/>
+              <a:t>C</a:t>
+            </a:r>
+          </a:p>
+          <a:p>
+            <a:r>
+              <a:rPr lang="bg-BG" dirty="0" smtClean="0"/>
+              <a:t>ВСЕКИ РЕД ЗАВЪРШВА С ;</a:t>
+            </a:r>
+          </a:p>
+          <a:p>
+            <a:r>
+              <a:rPr lang="bg-BG" smtClean="0"/>
+              <a:t>КОМЕНТАРИ - //, /* */</a:t>
+            </a:r>
+            <a:endParaRPr lang="en-US" dirty="0" smtClean="0"/>
+          </a:p>
+          <a:p>
+            <a:pPr marL="0" indent="0">
+              <a:buNone/>
+            </a:pPr>
+            <a:endParaRPr lang="en-US" dirty="0" smtClean="0"/>
+          </a:p>
+          <a:p>
+            <a:endParaRPr lang="en-US" dirty="0"/>
+          </a:p>
+        </p:txBody>
+      </p:sp>
+    </p:spTree>
+    <p:extLst>
+      <p:ext uri="{BB962C8B-B14F-4D97-AF65-F5344CB8AC3E}">
+        <p14:creationId xmlns:p14="http://schemas.microsoft.com/office/powerpoint/2010/main" val="3222169716"/>
       </p:ext>
     </p:extLst>
   </p:cSld>

</xml_diff>

<commit_message>
Modified PHP introduction presentation
</commit_message>
<xml_diff>
--- a/04.php-basics.pptx
+++ b/04.php-basics.pptx
@@ -11,6 +11,14 @@
     <p:sldId id="259" r:id="rId5"/>
     <p:sldId id="260" r:id="rId6"/>
     <p:sldId id="261" r:id="rId7"/>
+    <p:sldId id="263" r:id="rId8"/>
+    <p:sldId id="262" r:id="rId9"/>
+    <p:sldId id="264" r:id="rId10"/>
+    <p:sldId id="265" r:id="rId11"/>
+    <p:sldId id="266" r:id="rId12"/>
+    <p:sldId id="267" r:id="rId13"/>
+    <p:sldId id="268" r:id="rId14"/>
+    <p:sldId id="269" r:id="rId15"/>
   </p:sldIdLst>
   <p:sldSz cx="12192000" cy="6858000"/>
   <p:notesSz cx="6858000" cy="9144000"/>
@@ -288,7 +296,7 @@
           <a:p>
             <a:fld id="{8B1F5485-5187-459B-B3E0-6B07363DEE3D}" type="datetimeFigureOut">
               <a:rPr lang="en-US" smtClean="0"/>
-              <a:t>11/19/2014</a:t>
+              <a:t>20-Nov-14</a:t>
             </a:fld>
             <a:endParaRPr lang="en-US"/>
           </a:p>
@@ -600,7 +608,7 @@
           <a:p>
             <a:fld id="{8B1F5485-5187-459B-B3E0-6B07363DEE3D}" type="datetimeFigureOut">
               <a:rPr lang="en-US" smtClean="0"/>
-              <a:t>11/19/2014</a:t>
+              <a:t>20-Nov-14</a:t>
             </a:fld>
             <a:endParaRPr lang="en-US"/>
           </a:p>
@@ -822,7 +830,7 @@
           <a:p>
             <a:fld id="{8B1F5485-5187-459B-B3E0-6B07363DEE3D}" type="datetimeFigureOut">
               <a:rPr lang="en-US" smtClean="0"/>
-              <a:t>11/19/2014</a:t>
+              <a:t>20-Nov-14</a:t>
             </a:fld>
             <a:endParaRPr lang="en-US"/>
           </a:p>
@@ -1113,7 +1121,7 @@
           <a:p>
             <a:fld id="{8B1F5485-5187-459B-B3E0-6B07363DEE3D}" type="datetimeFigureOut">
               <a:rPr lang="en-US" smtClean="0"/>
-              <a:t>11/19/2014</a:t>
+              <a:t>20-Nov-14</a:t>
             </a:fld>
             <a:endParaRPr lang="en-US"/>
           </a:p>
@@ -1567,7 +1575,7 @@
           <a:p>
             <a:fld id="{8B1F5485-5187-459B-B3E0-6B07363DEE3D}" type="datetimeFigureOut">
               <a:rPr lang="en-US" smtClean="0"/>
-              <a:t>11/19/2014</a:t>
+              <a:t>20-Nov-14</a:t>
             </a:fld>
             <a:endParaRPr lang="en-US"/>
           </a:p>
@@ -2143,7 +2151,7 @@
           <a:p>
             <a:fld id="{8B1F5485-5187-459B-B3E0-6B07363DEE3D}" type="datetimeFigureOut">
               <a:rPr lang="en-US" smtClean="0"/>
-              <a:t>11/19/2014</a:t>
+              <a:t>20-Nov-14</a:t>
             </a:fld>
             <a:endParaRPr lang="en-US"/>
           </a:p>
@@ -2995,7 +3003,7 @@
           <a:p>
             <a:fld id="{8B1F5485-5187-459B-B3E0-6B07363DEE3D}" type="datetimeFigureOut">
               <a:rPr lang="en-US" smtClean="0"/>
-              <a:t>11/19/2014</a:t>
+              <a:t>20-Nov-14</a:t>
             </a:fld>
             <a:endParaRPr lang="en-US"/>
           </a:p>
@@ -3200,7 +3208,7 @@
           <a:p>
             <a:fld id="{8B1F5485-5187-459B-B3E0-6B07363DEE3D}" type="datetimeFigureOut">
               <a:rPr lang="en-US" smtClean="0"/>
-              <a:t>11/19/2014</a:t>
+              <a:t>20-Nov-14</a:t>
             </a:fld>
             <a:endParaRPr lang="en-US"/>
           </a:p>
@@ -3414,7 +3422,7 @@
           <a:p>
             <a:fld id="{8B1F5485-5187-459B-B3E0-6B07363DEE3D}" type="datetimeFigureOut">
               <a:rPr lang="en-US" smtClean="0"/>
-              <a:t>11/19/2014</a:t>
+              <a:t>20-Nov-14</a:t>
             </a:fld>
             <a:endParaRPr lang="en-US"/>
           </a:p>
@@ -3619,7 +3627,7 @@
           <a:p>
             <a:fld id="{8B1F5485-5187-459B-B3E0-6B07363DEE3D}" type="datetimeFigureOut">
               <a:rPr lang="en-US" smtClean="0"/>
-              <a:t>11/19/2014</a:t>
+              <a:t>20-Nov-14</a:t>
             </a:fld>
             <a:endParaRPr lang="en-US"/>
           </a:p>
@@ -3899,7 +3907,7 @@
           <a:p>
             <a:fld id="{8B1F5485-5187-459B-B3E0-6B07363DEE3D}" type="datetimeFigureOut">
               <a:rPr lang="en-US" smtClean="0"/>
-              <a:t>11/19/2014</a:t>
+              <a:t>20-Nov-14</a:t>
             </a:fld>
             <a:endParaRPr lang="en-US"/>
           </a:p>
@@ -4166,7 +4174,7 @@
           <a:p>
             <a:fld id="{8B1F5485-5187-459B-B3E0-6B07363DEE3D}" type="datetimeFigureOut">
               <a:rPr lang="en-US" smtClean="0"/>
-              <a:t>11/19/2014</a:t>
+              <a:t>20-Nov-14</a:t>
             </a:fld>
             <a:endParaRPr lang="en-US"/>
           </a:p>
@@ -4581,7 +4589,7 @@
           <a:p>
             <a:fld id="{8B1F5485-5187-459B-B3E0-6B07363DEE3D}" type="datetimeFigureOut">
               <a:rPr lang="en-US" smtClean="0"/>
-              <a:t>11/19/2014</a:t>
+              <a:t>20-Nov-14</a:t>
             </a:fld>
             <a:endParaRPr lang="en-US"/>
           </a:p>
@@ -4729,7 +4737,7 @@
           <a:p>
             <a:fld id="{8B1F5485-5187-459B-B3E0-6B07363DEE3D}" type="datetimeFigureOut">
               <a:rPr lang="en-US" smtClean="0"/>
-              <a:t>11/19/2014</a:t>
+              <a:t>20-Nov-14</a:t>
             </a:fld>
             <a:endParaRPr lang="en-US"/>
           </a:p>
@@ -4854,7 +4862,7 @@
           <a:p>
             <a:fld id="{8B1F5485-5187-459B-B3E0-6B07363DEE3D}" type="datetimeFigureOut">
               <a:rPr lang="en-US" smtClean="0"/>
-              <a:t>11/19/2014</a:t>
+              <a:t>20-Nov-14</a:t>
             </a:fld>
             <a:endParaRPr lang="en-US"/>
           </a:p>
@@ -5133,7 +5141,7 @@
           <a:p>
             <a:fld id="{8B1F5485-5187-459B-B3E0-6B07363DEE3D}" type="datetimeFigureOut">
               <a:rPr lang="en-US" smtClean="0"/>
-              <a:t>11/19/2014</a:t>
+              <a:t>20-Nov-14</a:t>
             </a:fld>
             <a:endParaRPr lang="en-US"/>
           </a:p>
@@ -5445,7 +5453,7 @@
           <a:p>
             <a:fld id="{8B1F5485-5187-459B-B3E0-6B07363DEE3D}" type="datetimeFigureOut">
               <a:rPr lang="en-US" smtClean="0"/>
-              <a:t>11/19/2014</a:t>
+              <a:t>20-Nov-14</a:t>
             </a:fld>
             <a:endParaRPr lang="en-US"/>
           </a:p>
@@ -5698,7 +5706,7 @@
           <a:p>
             <a:fld id="{8B1F5485-5187-459B-B3E0-6B07363DEE3D}" type="datetimeFigureOut">
               <a:rPr lang="en-US" smtClean="0"/>
-              <a:t>11/19/2014</a:t>
+              <a:t>20-Nov-14</a:t>
             </a:fld>
             <a:endParaRPr lang="en-US"/>
           </a:p>
@@ -6182,6 +6190,571 @@
 </p:sld>
 </file>
 
+<file path=ppt/slides/slide10.xml><?xml version="1.0" encoding="utf-8"?>
+<p:sld xmlns:a="http://schemas.openxmlformats.org/drawingml/2006/main" xmlns:r="http://schemas.openxmlformats.org/officeDocument/2006/relationships" xmlns:p="http://schemas.openxmlformats.org/presentationml/2006/main">
+  <p:cSld>
+    <p:spTree>
+      <p:nvGrpSpPr>
+        <p:cNvPr id="1" name=""/>
+        <p:cNvGrpSpPr/>
+        <p:nvPr/>
+      </p:nvGrpSpPr>
+      <p:grpSpPr>
+        <a:xfrm>
+          <a:off x="0" y="0"/>
+          <a:ext cx="0" cy="0"/>
+          <a:chOff x="0" y="0"/>
+          <a:chExt cx="0" cy="0"/>
+        </a:xfrm>
+      </p:grpSpPr>
+      <p:sp>
+        <p:nvSpPr>
+          <p:cNvPr id="2" name="Title 1"/>
+          <p:cNvSpPr>
+            <a:spLocks noGrp="1"/>
+          </p:cNvSpPr>
+          <p:nvPr>
+            <p:ph type="title"/>
+          </p:nvPr>
+        </p:nvSpPr>
+        <p:spPr/>
+        <p:txBody>
+          <a:bodyPr/>
+          <a:lstStyle/>
+          <a:p>
+            <a:r>
+              <a:rPr lang="bg-BG" dirty="0" smtClean="0"/>
+              <a:t>Конкатенация на стрингове</a:t>
+            </a:r>
+            <a:endParaRPr lang="en-US" dirty="0"/>
+          </a:p>
+        </p:txBody>
+      </p:sp>
+      <p:sp>
+        <p:nvSpPr>
+          <p:cNvPr id="3" name="Content Placeholder 2"/>
+          <p:cNvSpPr>
+            <a:spLocks noGrp="1"/>
+          </p:cNvSpPr>
+          <p:nvPr>
+            <p:ph sz="quarter" idx="13"/>
+          </p:nvPr>
+        </p:nvSpPr>
+        <p:spPr/>
+        <p:txBody>
+          <a:bodyPr/>
+          <a:lstStyle/>
+          <a:p>
+            <a:r>
+              <a:rPr lang="bg-BG" dirty="0" smtClean="0"/>
+              <a:t>Конкатенация означава събиране на два стрингови низа. </a:t>
+            </a:r>
+          </a:p>
+          <a:p>
+            <a:r>
+              <a:rPr lang="bg-BG" dirty="0" smtClean="0"/>
+              <a:t>Резултатът от конкатенация винаги е стрингов низ</a:t>
+            </a:r>
+          </a:p>
+          <a:p>
+            <a:r>
+              <a:rPr lang="bg-BG" dirty="0" smtClean="0"/>
+              <a:t>Операторът за конкатенация в </a:t>
+            </a:r>
+            <a:r>
+              <a:rPr lang="en-US" dirty="0" err="1" smtClean="0"/>
+              <a:t>php</a:t>
+            </a:r>
+            <a:r>
+              <a:rPr lang="en-US" dirty="0" smtClean="0"/>
+              <a:t> </a:t>
+            </a:r>
+            <a:r>
+              <a:rPr lang="bg-BG" dirty="0" smtClean="0"/>
+              <a:t>е точка .</a:t>
+            </a:r>
+          </a:p>
+        </p:txBody>
+      </p:sp>
+    </p:spTree>
+    <p:extLst>
+      <p:ext uri="{BB962C8B-B14F-4D97-AF65-F5344CB8AC3E}">
+        <p14:creationId xmlns:p14="http://schemas.microsoft.com/office/powerpoint/2010/main" val="240625661"/>
+      </p:ext>
+    </p:extLst>
+  </p:cSld>
+  <p:clrMapOvr>
+    <a:masterClrMapping/>
+  </p:clrMapOvr>
+</p:sld>
+</file>
+
+<file path=ppt/slides/slide11.xml><?xml version="1.0" encoding="utf-8"?>
+<p:sld xmlns:a="http://schemas.openxmlformats.org/drawingml/2006/main" xmlns:r="http://schemas.openxmlformats.org/officeDocument/2006/relationships" xmlns:p="http://schemas.openxmlformats.org/presentationml/2006/main">
+  <p:cSld>
+    <p:spTree>
+      <p:nvGrpSpPr>
+        <p:cNvPr id="1" name=""/>
+        <p:cNvGrpSpPr/>
+        <p:nvPr/>
+      </p:nvGrpSpPr>
+      <p:grpSpPr>
+        <a:xfrm>
+          <a:off x="0" y="0"/>
+          <a:ext cx="0" cy="0"/>
+          <a:chOff x="0" y="0"/>
+          <a:chExt cx="0" cy="0"/>
+        </a:xfrm>
+      </p:grpSpPr>
+      <p:sp>
+        <p:nvSpPr>
+          <p:cNvPr id="2" name="Title 1"/>
+          <p:cNvSpPr>
+            <a:spLocks noGrp="1"/>
+          </p:cNvSpPr>
+          <p:nvPr>
+            <p:ph type="title"/>
+          </p:nvPr>
+        </p:nvSpPr>
+        <p:spPr/>
+        <p:txBody>
+          <a:bodyPr/>
+          <a:lstStyle/>
+          <a:p>
+            <a:r>
+              <a:rPr lang="bg-BG" dirty="0" smtClean="0"/>
+              <a:t>Конкатенация демо</a:t>
+            </a:r>
+            <a:endParaRPr lang="en-US" dirty="0"/>
+          </a:p>
+        </p:txBody>
+      </p:sp>
+      <p:pic>
+        <p:nvPicPr>
+          <p:cNvPr id="3074" name="Picture 2" descr="http://upload.wikimedia.org/wikipedia/commons/2/28/C_language_shalom_olam_string_concatenation.png"/>
+          <p:cNvPicPr>
+            <a:picLocks noChangeAspect="1" noChangeArrowheads="1"/>
+          </p:cNvPicPr>
+          <p:nvPr/>
+        </p:nvPicPr>
+        <p:blipFill>
+          <a:blip r:embed="rId2">
+            <a:extLst>
+              <a:ext uri="{28A0092B-C50C-407E-A947-70E740481C1C}">
+                <a14:useLocalDpi xmlns:a14="http://schemas.microsoft.com/office/drawing/2010/main" val="0"/>
+              </a:ext>
+            </a:extLst>
+          </a:blip>
+          <a:srcRect/>
+          <a:stretch>
+            <a:fillRect/>
+          </a:stretch>
+        </p:blipFill>
+        <p:spPr bwMode="auto">
+          <a:xfrm>
+            <a:off x="2662237" y="2079702"/>
+            <a:ext cx="6867525" cy="4352926"/>
+          </a:xfrm>
+          <a:prstGeom prst="rect">
+            <a:avLst/>
+          </a:prstGeom>
+          <a:noFill/>
+          <a:extLst>
+            <a:ext uri="{909E8E84-426E-40DD-AFC4-6F175D3DCCD1}">
+              <a14:hiddenFill xmlns:a14="http://schemas.microsoft.com/office/drawing/2010/main">
+                <a:solidFill>
+                  <a:srgbClr val="FFFFFF"/>
+                </a:solidFill>
+              </a14:hiddenFill>
+            </a:ext>
+          </a:extLst>
+        </p:spPr>
+      </p:pic>
+    </p:spTree>
+    <p:extLst>
+      <p:ext uri="{BB962C8B-B14F-4D97-AF65-F5344CB8AC3E}">
+        <p14:creationId xmlns:p14="http://schemas.microsoft.com/office/powerpoint/2010/main" val="1834911565"/>
+      </p:ext>
+    </p:extLst>
+  </p:cSld>
+  <p:clrMapOvr>
+    <a:masterClrMapping/>
+  </p:clrMapOvr>
+</p:sld>
+</file>
+
+<file path=ppt/slides/slide12.xml><?xml version="1.0" encoding="utf-8"?>
+<p:sld xmlns:a="http://schemas.openxmlformats.org/drawingml/2006/main" xmlns:r="http://schemas.openxmlformats.org/officeDocument/2006/relationships" xmlns:p="http://schemas.openxmlformats.org/presentationml/2006/main">
+  <p:cSld>
+    <p:spTree>
+      <p:nvGrpSpPr>
+        <p:cNvPr id="1" name=""/>
+        <p:cNvGrpSpPr/>
+        <p:nvPr/>
+      </p:nvGrpSpPr>
+      <p:grpSpPr>
+        <a:xfrm>
+          <a:off x="0" y="0"/>
+          <a:ext cx="0" cy="0"/>
+          <a:chOff x="0" y="0"/>
+          <a:chExt cx="0" cy="0"/>
+        </a:xfrm>
+      </p:grpSpPr>
+      <p:sp>
+        <p:nvSpPr>
+          <p:cNvPr id="2" name="Title 1"/>
+          <p:cNvSpPr>
+            <a:spLocks noGrp="1"/>
+          </p:cNvSpPr>
+          <p:nvPr>
+            <p:ph type="title"/>
+          </p:nvPr>
+        </p:nvSpPr>
+        <p:spPr/>
+        <p:txBody>
+          <a:bodyPr/>
+          <a:lstStyle/>
+          <a:p>
+            <a:r>
+              <a:rPr lang="bg-BG" dirty="0" smtClean="0"/>
+              <a:t>Конструкцията </a:t>
+            </a:r>
+            <a:r>
+              <a:rPr lang="en-US" dirty="0" smtClean="0"/>
+              <a:t>if else</a:t>
+            </a:r>
+            <a:endParaRPr lang="en-US" dirty="0"/>
+          </a:p>
+        </p:txBody>
+      </p:sp>
+      <p:sp>
+        <p:nvSpPr>
+          <p:cNvPr id="3" name="Content Placeholder 2"/>
+          <p:cNvSpPr>
+            <a:spLocks noGrp="1"/>
+          </p:cNvSpPr>
+          <p:nvPr>
+            <p:ph sz="quarter" idx="13"/>
+          </p:nvPr>
+        </p:nvSpPr>
+        <p:spPr>
+          <a:xfrm>
+            <a:off x="913775" y="2367092"/>
+            <a:ext cx="10363826" cy="3424107"/>
+          </a:xfrm>
+        </p:spPr>
+        <p:txBody>
+          <a:bodyPr/>
+          <a:lstStyle/>
+          <a:p>
+            <a:r>
+              <a:rPr lang="en-US" dirty="0" smtClean="0"/>
+              <a:t>If </a:t>
+            </a:r>
+            <a:r>
+              <a:rPr lang="bg-BG" dirty="0" smtClean="0"/>
+              <a:t>Конструкция за проверка дали дадено условие е удовлетворено</a:t>
+            </a:r>
+            <a:endParaRPr lang="en-US" dirty="0" smtClean="0"/>
+          </a:p>
+          <a:p>
+            <a:r>
+              <a:rPr lang="bg-BG" dirty="0" smtClean="0"/>
+              <a:t>Ако условието не е удовлетворено се изпълнява </a:t>
+            </a:r>
+            <a:r>
+              <a:rPr lang="en-US" dirty="0" smtClean="0"/>
+              <a:t>else </a:t>
+            </a:r>
+            <a:r>
+              <a:rPr lang="bg-BG" dirty="0" smtClean="0"/>
+              <a:t>блокът</a:t>
+            </a:r>
+          </a:p>
+          <a:p>
+            <a:r>
+              <a:rPr lang="bg-BG" dirty="0" smtClean="0"/>
+              <a:t>Оператори за сравняване </a:t>
+            </a:r>
+            <a:r>
+              <a:rPr lang="en-US" dirty="0" smtClean="0"/>
+              <a:t>==,</a:t>
+            </a:r>
+            <a:r>
+              <a:rPr lang="en-US" dirty="0"/>
+              <a:t> !=,</a:t>
+            </a:r>
+            <a:r>
+              <a:rPr lang="en-US" dirty="0" smtClean="0"/>
+              <a:t> </a:t>
+            </a:r>
+            <a:r>
+              <a:rPr lang="en-US" dirty="0"/>
+              <a:t>&lt;=, &gt;=, </a:t>
+            </a:r>
+            <a:r>
+              <a:rPr lang="en-US" dirty="0" smtClean="0"/>
+              <a:t>&lt;, </a:t>
+            </a:r>
+            <a:r>
+              <a:rPr lang="en-US" dirty="0"/>
+              <a:t>&gt; </a:t>
+            </a:r>
+          </a:p>
+        </p:txBody>
+      </p:sp>
+    </p:spTree>
+    <p:extLst>
+      <p:ext uri="{BB962C8B-B14F-4D97-AF65-F5344CB8AC3E}">
+        <p14:creationId xmlns:p14="http://schemas.microsoft.com/office/powerpoint/2010/main" val="327526346"/>
+      </p:ext>
+    </p:extLst>
+  </p:cSld>
+  <p:clrMapOvr>
+    <a:masterClrMapping/>
+  </p:clrMapOvr>
+</p:sld>
+</file>
+
+<file path=ppt/slides/slide13.xml><?xml version="1.0" encoding="utf-8"?>
+<p:sld xmlns:a="http://schemas.openxmlformats.org/drawingml/2006/main" xmlns:r="http://schemas.openxmlformats.org/officeDocument/2006/relationships" xmlns:p="http://schemas.openxmlformats.org/presentationml/2006/main">
+  <p:cSld>
+    <p:spTree>
+      <p:nvGrpSpPr>
+        <p:cNvPr id="1" name=""/>
+        <p:cNvGrpSpPr/>
+        <p:nvPr/>
+      </p:nvGrpSpPr>
+      <p:grpSpPr>
+        <a:xfrm>
+          <a:off x="0" y="0"/>
+          <a:ext cx="0" cy="0"/>
+          <a:chOff x="0" y="0"/>
+          <a:chExt cx="0" cy="0"/>
+        </a:xfrm>
+      </p:grpSpPr>
+      <p:sp>
+        <p:nvSpPr>
+          <p:cNvPr id="2" name="Title 1"/>
+          <p:cNvSpPr>
+            <a:spLocks noGrp="1"/>
+          </p:cNvSpPr>
+          <p:nvPr>
+            <p:ph type="title"/>
+          </p:nvPr>
+        </p:nvSpPr>
+        <p:spPr/>
+        <p:txBody>
+          <a:bodyPr/>
+          <a:lstStyle/>
+          <a:p>
+            <a:r>
+              <a:rPr lang="en-US" dirty="0" smtClean="0"/>
+              <a:t>If else </a:t>
+            </a:r>
+            <a:r>
+              <a:rPr lang="bg-BG" dirty="0" smtClean="0"/>
+              <a:t>ДЕМО</a:t>
+            </a:r>
+            <a:endParaRPr lang="en-US" dirty="0"/>
+          </a:p>
+        </p:txBody>
+      </p:sp>
+      <p:pic>
+        <p:nvPicPr>
+          <p:cNvPr id="4098" name="Picture 2" descr="http://thejtsite.com/images/uploads/ifelsecustomfield.jpg"/>
+          <p:cNvPicPr>
+            <a:picLocks noChangeAspect="1" noChangeArrowheads="1"/>
+          </p:cNvPicPr>
+          <p:nvPr/>
+        </p:nvPicPr>
+        <p:blipFill>
+          <a:blip r:embed="rId2">
+            <a:extLst>
+              <a:ext uri="{28A0092B-C50C-407E-A947-70E740481C1C}">
+                <a14:useLocalDpi xmlns:a14="http://schemas.microsoft.com/office/drawing/2010/main" val="0"/>
+              </a:ext>
+            </a:extLst>
+          </a:blip>
+          <a:srcRect/>
+          <a:stretch>
+            <a:fillRect/>
+          </a:stretch>
+        </p:blipFill>
+        <p:spPr bwMode="auto">
+          <a:xfrm>
+            <a:off x="1887511" y="2214694"/>
+            <a:ext cx="8416977" cy="4208489"/>
+          </a:xfrm>
+          <a:prstGeom prst="rect">
+            <a:avLst/>
+          </a:prstGeom>
+          <a:noFill/>
+          <a:extLst>
+            <a:ext uri="{909E8E84-426E-40DD-AFC4-6F175D3DCCD1}">
+              <a14:hiddenFill xmlns:a14="http://schemas.microsoft.com/office/drawing/2010/main">
+                <a:solidFill>
+                  <a:srgbClr val="FFFFFF"/>
+                </a:solidFill>
+              </a14:hiddenFill>
+            </a:ext>
+          </a:extLst>
+        </p:spPr>
+      </p:pic>
+    </p:spTree>
+    <p:extLst>
+      <p:ext uri="{BB962C8B-B14F-4D97-AF65-F5344CB8AC3E}">
+        <p14:creationId xmlns:p14="http://schemas.microsoft.com/office/powerpoint/2010/main" val="2008487846"/>
+      </p:ext>
+    </p:extLst>
+  </p:cSld>
+  <p:clrMapOvr>
+    <a:masterClrMapping/>
+  </p:clrMapOvr>
+</p:sld>
+</file>
+
+<file path=ppt/slides/slide14.xml><?xml version="1.0" encoding="utf-8"?>
+<p:sld xmlns:a="http://schemas.openxmlformats.org/drawingml/2006/main" xmlns:r="http://schemas.openxmlformats.org/officeDocument/2006/relationships" xmlns:p="http://schemas.openxmlformats.org/presentationml/2006/main">
+  <p:cSld>
+    <p:spTree>
+      <p:nvGrpSpPr>
+        <p:cNvPr id="1" name=""/>
+        <p:cNvGrpSpPr/>
+        <p:nvPr/>
+      </p:nvGrpSpPr>
+      <p:grpSpPr>
+        <a:xfrm>
+          <a:off x="0" y="0"/>
+          <a:ext cx="0" cy="0"/>
+          <a:chOff x="0" y="0"/>
+          <a:chExt cx="0" cy="0"/>
+        </a:xfrm>
+      </p:grpSpPr>
+      <p:sp>
+        <p:nvSpPr>
+          <p:cNvPr id="2" name="Title 1"/>
+          <p:cNvSpPr>
+            <a:spLocks noGrp="1"/>
+          </p:cNvSpPr>
+          <p:nvPr>
+            <p:ph type="title"/>
+          </p:nvPr>
+        </p:nvSpPr>
+        <p:spPr/>
+        <p:txBody>
+          <a:bodyPr/>
+          <a:lstStyle/>
+          <a:p>
+            <a:r>
+              <a:rPr lang="bg-BG" dirty="0" smtClean="0"/>
+              <a:t>Задача</a:t>
+            </a:r>
+            <a:endParaRPr lang="en-US" dirty="0"/>
+          </a:p>
+        </p:txBody>
+      </p:sp>
+      <p:sp>
+        <p:nvSpPr>
+          <p:cNvPr id="3" name="Content Placeholder 2"/>
+          <p:cNvSpPr>
+            <a:spLocks noGrp="1"/>
+          </p:cNvSpPr>
+          <p:nvPr>
+            <p:ph sz="quarter" idx="13"/>
+          </p:nvPr>
+        </p:nvSpPr>
+        <p:spPr/>
+        <p:txBody>
+          <a:bodyPr>
+            <a:normAutofit/>
+          </a:bodyPr>
+          <a:lstStyle/>
+          <a:p>
+            <a:pPr marL="0" indent="0">
+              <a:buNone/>
+            </a:pPr>
+            <a:r>
+              <a:rPr lang="bg-BG" dirty="0" smtClean="0"/>
+              <a:t>Създайте цифрова променлива със стойност 64. </a:t>
+            </a:r>
+          </a:p>
+          <a:p>
+            <a:pPr marL="0" indent="0">
+              <a:buNone/>
+            </a:pPr>
+            <a:r>
+              <a:rPr lang="bg-BG" dirty="0" smtClean="0"/>
+              <a:t>изградете </a:t>
+            </a:r>
+            <a:r>
+              <a:rPr lang="en-US" dirty="0" smtClean="0"/>
+              <a:t>if </a:t>
+            </a:r>
+            <a:r>
+              <a:rPr lang="bg-BG" dirty="0" smtClean="0"/>
+              <a:t>структури, които проверяват:</a:t>
+            </a:r>
+          </a:p>
+          <a:p>
+            <a:pPr>
+              <a:buFontTx/>
+              <a:buChar char="-"/>
+            </a:pPr>
+            <a:r>
+              <a:rPr lang="bg-BG" dirty="0" smtClean="0"/>
+              <a:t>Дали стойността е равна на 15 – ако да изпишете на екрана „аз съм 15“</a:t>
+            </a:r>
+          </a:p>
+          <a:p>
+            <a:pPr>
+              <a:buFontTx/>
+              <a:buChar char="-"/>
+            </a:pPr>
+            <a:r>
+              <a:rPr lang="bg-BG" dirty="0" smtClean="0"/>
+              <a:t>Дали стойността е по-голяма от 26 – ако да изпишете „по-голямо от 26“</a:t>
+            </a:r>
+          </a:p>
+          <a:p>
+            <a:pPr>
+              <a:buFontTx/>
+              <a:buChar char="-"/>
+            </a:pPr>
+            <a:r>
+              <a:rPr lang="bg-BG" dirty="0" smtClean="0"/>
+              <a:t>Дали стойността е по-малка или равна от 64 – ако да изпишете „по-малко или равно от 64“. Текстът трябва да е на червен фон.</a:t>
+            </a:r>
+          </a:p>
+          <a:p>
+            <a:pPr marL="0" indent="0">
+              <a:buNone/>
+            </a:pPr>
+            <a:r>
+              <a:rPr lang="bg-BG" dirty="0" smtClean="0"/>
+              <a:t>Променете стойността на променливата на 15 и </a:t>
+            </a:r>
+            <a:r>
+              <a:rPr lang="bg-BG" smtClean="0"/>
+              <a:t>вижте резултата</a:t>
+            </a:r>
+            <a:endParaRPr lang="bg-BG" dirty="0" smtClean="0"/>
+          </a:p>
+        </p:txBody>
+      </p:sp>
+    </p:spTree>
+    <p:extLst>
+      <p:ext uri="{BB962C8B-B14F-4D97-AF65-F5344CB8AC3E}">
+        <p14:creationId xmlns:p14="http://schemas.microsoft.com/office/powerpoint/2010/main" val="1801667079"/>
+      </p:ext>
+    </p:extLst>
+  </p:cSld>
+  <p:clrMapOvr>
+    <a:masterClrMapping/>
+  </p:clrMapOvr>
+</p:sld>
+</file>
+
 <file path=ppt/slides/slide2.xml><?xml version="1.0" encoding="utf-8"?>
 <p:sld xmlns:a="http://schemas.openxmlformats.org/drawingml/2006/main" xmlns:r="http://schemas.openxmlformats.org/officeDocument/2006/relationships" xmlns:p="http://schemas.openxmlformats.org/presentationml/2006/main">
   <p:cSld>
@@ -6265,11 +6838,7 @@
           <a:p>
             <a:r>
               <a:rPr lang="bg-BG" dirty="0" smtClean="0"/>
-              <a:t>Осигурява </a:t>
-            </a:r>
-            <a:r>
-              <a:rPr lang="bg-BG" dirty="0" smtClean="0"/>
-              <a:t>връзка с база данни</a:t>
+              <a:t>Осигурява връзка с база данни</a:t>
             </a:r>
           </a:p>
           <a:p>
@@ -6279,11 +6848,7 @@
             </a:r>
             <a:r>
               <a:rPr lang="en-US" dirty="0" smtClean="0"/>
-              <a:t>web server (apache, engine x</a:t>
-            </a:r>
-            <a:r>
-              <a:rPr lang="en-US" dirty="0" smtClean="0"/>
-              <a:t>)</a:t>
+              <a:t>web server (apache, engine x)</a:t>
             </a:r>
           </a:p>
           <a:p>
@@ -6730,9 +7295,16 @@
             <p:ph sz="quarter" idx="13"/>
           </p:nvPr>
         </p:nvSpPr>
-        <p:spPr/>
-        <p:txBody>
-          <a:bodyPr/>
+        <p:spPr>
+          <a:xfrm>
+            <a:off x="913774" y="2367092"/>
+            <a:ext cx="10363826" cy="4258560"/>
+          </a:xfrm>
+        </p:spPr>
+        <p:txBody>
+          <a:bodyPr>
+            <a:normAutofit/>
+          </a:bodyPr>
           <a:lstStyle/>
           <a:p>
             <a:r>
@@ -6813,8 +7385,8 @@
               <a:t>Синтаксиса е </a:t>
             </a:r>
             <a:r>
-              <a:rPr lang="bg-BG" dirty="0" err="1" smtClean="0"/>
-              <a:t>илеснен</a:t>
+              <a:rPr lang="bg-BG" dirty="0" smtClean="0"/>
+              <a:t>улеснен</a:t>
             </a:r>
             <a:endParaRPr lang="bg-BG" dirty="0" smtClean="0"/>
           </a:p>
@@ -6824,21 +7396,48 @@
               <a:t>Синтаксиса е подобен на </a:t>
             </a:r>
             <a:r>
+              <a:rPr lang="bg-BG" dirty="0" smtClean="0"/>
+              <a:t>синтаксиса на езика </a:t>
+            </a:r>
+            <a:r>
               <a:rPr lang="en-US" dirty="0" smtClean="0"/>
               <a:t>C</a:t>
             </a:r>
+            <a:endParaRPr lang="en-US" dirty="0" smtClean="0"/>
           </a:p>
           <a:p>
             <a:r>
               <a:rPr lang="bg-BG" dirty="0" smtClean="0"/>
-              <a:t>ВСЕКИ РЕД ЗАВЪРШВА С ;</a:t>
-            </a:r>
-          </a:p>
-          <a:p>
-            <a:r>
-              <a:rPr lang="bg-BG" smtClean="0"/>
-              <a:t>КОМЕНТАРИ - //, /* */</a:t>
-            </a:r>
+              <a:t>ВСЕКИ РЕД ЗАВЪРШВА С </a:t>
+            </a:r>
+            <a:r>
+              <a:rPr lang="bg-BG" sz="4000" b="1" dirty="0" smtClean="0"/>
+              <a:t>;</a:t>
+            </a:r>
+            <a:endParaRPr lang="bg-BG" b="1" dirty="0" smtClean="0"/>
+          </a:p>
+          <a:p>
+            <a:r>
+              <a:rPr lang="bg-BG" dirty="0" smtClean="0"/>
+              <a:t>КОМЕНТАРИ - //, /* </a:t>
+            </a:r>
+            <a:r>
+              <a:rPr lang="bg-BG" dirty="0" smtClean="0"/>
+              <a:t>*/, </a:t>
+            </a:r>
+            <a:r>
+              <a:rPr lang="en-US" dirty="0" smtClean="0"/>
+              <a:t>#</a:t>
+            </a:r>
+            <a:r>
+              <a:rPr lang="bg-BG" dirty="0" smtClean="0"/>
+              <a:t> - те не се изпълняват, а служат само за пояснение и помагат на програмистите</a:t>
+            </a:r>
+          </a:p>
+          <a:p>
+            <a:pPr marL="0" indent="0">
+              <a:buNone/>
+            </a:pPr>
             <a:endParaRPr lang="en-US" dirty="0" smtClean="0"/>
           </a:p>
           <a:p>
@@ -6856,6 +7455,329 @@
     <p:extLst>
       <p:ext uri="{BB962C8B-B14F-4D97-AF65-F5344CB8AC3E}">
         <p14:creationId xmlns:p14="http://schemas.microsoft.com/office/powerpoint/2010/main" val="3222169716"/>
+      </p:ext>
+    </p:extLst>
+  </p:cSld>
+  <p:clrMapOvr>
+    <a:masterClrMapping/>
+  </p:clrMapOvr>
+</p:sld>
+</file>
+
+<file path=ppt/slides/slide7.xml><?xml version="1.0" encoding="utf-8"?>
+<p:sld xmlns:a="http://schemas.openxmlformats.org/drawingml/2006/main" xmlns:r="http://schemas.openxmlformats.org/officeDocument/2006/relationships" xmlns:p="http://schemas.openxmlformats.org/presentationml/2006/main">
+  <p:cSld>
+    <p:spTree>
+      <p:nvGrpSpPr>
+        <p:cNvPr id="1" name=""/>
+        <p:cNvGrpSpPr/>
+        <p:nvPr/>
+      </p:nvGrpSpPr>
+      <p:grpSpPr>
+        <a:xfrm>
+          <a:off x="0" y="0"/>
+          <a:ext cx="0" cy="0"/>
+          <a:chOff x="0" y="0"/>
+          <a:chExt cx="0" cy="0"/>
+        </a:xfrm>
+      </p:grpSpPr>
+      <p:sp>
+        <p:nvSpPr>
+          <p:cNvPr id="2" name="Title 1"/>
+          <p:cNvSpPr>
+            <a:spLocks noGrp="1"/>
+          </p:cNvSpPr>
+          <p:nvPr>
+            <p:ph type="title"/>
+          </p:nvPr>
+        </p:nvSpPr>
+        <p:spPr/>
+        <p:txBody>
+          <a:bodyPr/>
+          <a:lstStyle/>
+          <a:p>
+            <a:r>
+              <a:rPr lang="en-US" dirty="0" smtClean="0"/>
+              <a:t>PHP </a:t>
+            </a:r>
+            <a:r>
+              <a:rPr lang="bg-BG" dirty="0" smtClean="0"/>
+              <a:t>коментари демо</a:t>
+            </a:r>
+            <a:endParaRPr lang="en-US" dirty="0"/>
+          </a:p>
+        </p:txBody>
+      </p:sp>
+      <p:pic>
+        <p:nvPicPr>
+          <p:cNvPr id="1026" name="Picture 2" descr="http://heidelblog.net/wp-content/uploads/2014/08/Comments-281x300.jpg"/>
+          <p:cNvPicPr>
+            <a:picLocks noChangeAspect="1" noChangeArrowheads="1"/>
+          </p:cNvPicPr>
+          <p:nvPr/>
+        </p:nvPicPr>
+        <p:blipFill>
+          <a:blip r:embed="rId2">
+            <a:extLst>
+              <a:ext uri="{28A0092B-C50C-407E-A947-70E740481C1C}">
+                <a14:useLocalDpi xmlns:a14="http://schemas.microsoft.com/office/drawing/2010/main" val="0"/>
+              </a:ext>
+            </a:extLst>
+          </a:blip>
+          <a:srcRect/>
+          <a:stretch>
+            <a:fillRect/>
+          </a:stretch>
+        </p:blipFill>
+        <p:spPr bwMode="auto">
+          <a:xfrm>
+            <a:off x="4322842" y="2214694"/>
+            <a:ext cx="3771847" cy="4026883"/>
+          </a:xfrm>
+          <a:prstGeom prst="rect">
+            <a:avLst/>
+          </a:prstGeom>
+          <a:noFill/>
+          <a:extLst>
+            <a:ext uri="{909E8E84-426E-40DD-AFC4-6F175D3DCCD1}">
+              <a14:hiddenFill xmlns:a14="http://schemas.microsoft.com/office/drawing/2010/main">
+                <a:solidFill>
+                  <a:srgbClr val="FFFFFF"/>
+                </a:solidFill>
+              </a14:hiddenFill>
+            </a:ext>
+          </a:extLst>
+        </p:spPr>
+      </p:pic>
+    </p:spTree>
+    <p:extLst>
+      <p:ext uri="{BB962C8B-B14F-4D97-AF65-F5344CB8AC3E}">
+        <p14:creationId xmlns:p14="http://schemas.microsoft.com/office/powerpoint/2010/main" val="1453598038"/>
+      </p:ext>
+    </p:extLst>
+  </p:cSld>
+  <p:clrMapOvr>
+    <a:masterClrMapping/>
+  </p:clrMapOvr>
+</p:sld>
+</file>
+
+<file path=ppt/slides/slide8.xml><?xml version="1.0" encoding="utf-8"?>
+<p:sld xmlns:a="http://schemas.openxmlformats.org/drawingml/2006/main" xmlns:r="http://schemas.openxmlformats.org/officeDocument/2006/relationships" xmlns:p="http://schemas.openxmlformats.org/presentationml/2006/main">
+  <p:cSld>
+    <p:spTree>
+      <p:nvGrpSpPr>
+        <p:cNvPr id="1" name=""/>
+        <p:cNvGrpSpPr/>
+        <p:nvPr/>
+      </p:nvGrpSpPr>
+      <p:grpSpPr>
+        <a:xfrm>
+          <a:off x="0" y="0"/>
+          <a:ext cx="0" cy="0"/>
+          <a:chOff x="0" y="0"/>
+          <a:chExt cx="0" cy="0"/>
+        </a:xfrm>
+      </p:grpSpPr>
+      <p:sp>
+        <p:nvSpPr>
+          <p:cNvPr id="2" name="Title 1"/>
+          <p:cNvSpPr>
+            <a:spLocks noGrp="1"/>
+          </p:cNvSpPr>
+          <p:nvPr>
+            <p:ph type="title"/>
+          </p:nvPr>
+        </p:nvSpPr>
+        <p:spPr/>
+        <p:txBody>
+          <a:bodyPr/>
+          <a:lstStyle/>
+          <a:p>
+            <a:r>
+              <a:rPr lang="en-US" dirty="0" smtClean="0"/>
+              <a:t>PHP </a:t>
+            </a:r>
+            <a:r>
+              <a:rPr lang="bg-BG" dirty="0" smtClean="0"/>
+              <a:t>Променливи</a:t>
+            </a:r>
+            <a:endParaRPr lang="en-US" dirty="0"/>
+          </a:p>
+        </p:txBody>
+      </p:sp>
+      <p:sp>
+        <p:nvSpPr>
+          <p:cNvPr id="3" name="Content Placeholder 2"/>
+          <p:cNvSpPr>
+            <a:spLocks noGrp="1"/>
+          </p:cNvSpPr>
+          <p:nvPr>
+            <p:ph sz="quarter" idx="13"/>
+          </p:nvPr>
+        </p:nvSpPr>
+        <p:spPr/>
+        <p:txBody>
+          <a:bodyPr/>
+          <a:lstStyle/>
+          <a:p>
+            <a:r>
+              <a:rPr lang="bg-BG" dirty="0" smtClean="0"/>
+              <a:t>Променливите служат за да съхраняват стойности</a:t>
+            </a:r>
+          </a:p>
+          <a:p>
+            <a:r>
+              <a:rPr lang="bg-BG" dirty="0" smtClean="0"/>
+              <a:t>Всяка променлива в </a:t>
+            </a:r>
+            <a:r>
+              <a:rPr lang="en-US" dirty="0" err="1" smtClean="0"/>
+              <a:t>php</a:t>
+            </a:r>
+            <a:r>
+              <a:rPr lang="en-US" dirty="0" smtClean="0"/>
+              <a:t> </a:t>
+            </a:r>
+            <a:r>
+              <a:rPr lang="bg-BG" dirty="0" smtClean="0"/>
+              <a:t>започва с долар </a:t>
+            </a:r>
+            <a:r>
+              <a:rPr lang="en-US" dirty="0" smtClean="0"/>
+              <a:t>$</a:t>
+            </a:r>
+            <a:endParaRPr lang="bg-BG" dirty="0" smtClean="0"/>
+          </a:p>
+          <a:p>
+            <a:r>
+              <a:rPr lang="bg-BG" dirty="0" smtClean="0"/>
+              <a:t>Променливи могат да бъдат: стрингови низове, цели числа, динамични числа,  булеви стойности, обекти и др.</a:t>
+            </a:r>
+          </a:p>
+          <a:p>
+            <a:r>
+              <a:rPr lang="en-US" dirty="0" smtClean="0"/>
+              <a:t>PHP e </a:t>
+            </a:r>
+            <a:r>
+              <a:rPr lang="bg-BG" dirty="0" smtClean="0"/>
+              <a:t>слабо типизиран език</a:t>
+            </a:r>
+          </a:p>
+          <a:p>
+            <a:r>
+              <a:rPr lang="bg-BG" dirty="0" smtClean="0"/>
+              <a:t>Променливите са основна част от програмирането</a:t>
+            </a:r>
+          </a:p>
+          <a:p>
+            <a:endParaRPr lang="bg-BG" dirty="0"/>
+          </a:p>
+        </p:txBody>
+      </p:sp>
+    </p:spTree>
+    <p:extLst>
+      <p:ext uri="{BB962C8B-B14F-4D97-AF65-F5344CB8AC3E}">
+        <p14:creationId xmlns:p14="http://schemas.microsoft.com/office/powerpoint/2010/main" val="1933883324"/>
+      </p:ext>
+    </p:extLst>
+  </p:cSld>
+  <p:clrMapOvr>
+    <a:masterClrMapping/>
+  </p:clrMapOvr>
+</p:sld>
+</file>
+
+<file path=ppt/slides/slide9.xml><?xml version="1.0" encoding="utf-8"?>
+<p:sld xmlns:a="http://schemas.openxmlformats.org/drawingml/2006/main" xmlns:r="http://schemas.openxmlformats.org/officeDocument/2006/relationships" xmlns:p="http://schemas.openxmlformats.org/presentationml/2006/main">
+  <p:cSld>
+    <p:spTree>
+      <p:nvGrpSpPr>
+        <p:cNvPr id="1" name=""/>
+        <p:cNvGrpSpPr/>
+        <p:nvPr/>
+      </p:nvGrpSpPr>
+      <p:grpSpPr>
+        <a:xfrm>
+          <a:off x="0" y="0"/>
+          <a:ext cx="0" cy="0"/>
+          <a:chOff x="0" y="0"/>
+          <a:chExt cx="0" cy="0"/>
+        </a:xfrm>
+      </p:grpSpPr>
+      <p:sp>
+        <p:nvSpPr>
+          <p:cNvPr id="2" name="Title 1"/>
+          <p:cNvSpPr>
+            <a:spLocks noGrp="1"/>
+          </p:cNvSpPr>
+          <p:nvPr>
+            <p:ph type="title"/>
+          </p:nvPr>
+        </p:nvSpPr>
+        <p:spPr/>
+        <p:txBody>
+          <a:bodyPr/>
+          <a:lstStyle/>
+          <a:p>
+            <a:r>
+              <a:rPr lang="en-US" dirty="0" smtClean="0"/>
+              <a:t>PHP </a:t>
+            </a:r>
+            <a:r>
+              <a:rPr lang="bg-BG" dirty="0" smtClean="0"/>
+              <a:t>Променливи демо</a:t>
+            </a:r>
+            <a:endParaRPr lang="en-US" dirty="0"/>
+          </a:p>
+        </p:txBody>
+      </p:sp>
+      <p:pic>
+        <p:nvPicPr>
+          <p:cNvPr id="2050" name="Picture 2" descr="http://www.zentut.com/wp-content/uploads/2013/02/php-variable.jpg"/>
+          <p:cNvPicPr>
+            <a:picLocks noChangeAspect="1" noChangeArrowheads="1"/>
+          </p:cNvPicPr>
+          <p:nvPr/>
+        </p:nvPicPr>
+        <p:blipFill>
+          <a:blip r:embed="rId2">
+            <a:extLst>
+              <a:ext uri="{28A0092B-C50C-407E-A947-70E740481C1C}">
+                <a14:useLocalDpi xmlns:a14="http://schemas.microsoft.com/office/drawing/2010/main" val="0"/>
+              </a:ext>
+            </a:extLst>
+          </a:blip>
+          <a:srcRect/>
+          <a:stretch>
+            <a:fillRect/>
+          </a:stretch>
+        </p:blipFill>
+        <p:spPr bwMode="auto">
+          <a:xfrm>
+            <a:off x="3048780" y="2559648"/>
+            <a:ext cx="6094439" cy="3476408"/>
+          </a:xfrm>
+          <a:prstGeom prst="rect">
+            <a:avLst/>
+          </a:prstGeom>
+          <a:noFill/>
+          <a:extLst>
+            <a:ext uri="{909E8E84-426E-40DD-AFC4-6F175D3DCCD1}">
+              <a14:hiddenFill xmlns:a14="http://schemas.microsoft.com/office/drawing/2010/main">
+                <a:solidFill>
+                  <a:srgbClr val="FFFFFF"/>
+                </a:solidFill>
+              </a14:hiddenFill>
+            </a:ext>
+          </a:extLst>
+        </p:spPr>
+      </p:pic>
+    </p:spTree>
+    <p:extLst>
+      <p:ext uri="{BB962C8B-B14F-4D97-AF65-F5344CB8AC3E}">
+        <p14:creationId xmlns:p14="http://schemas.microsoft.com/office/powerpoint/2010/main" val="76950382"/>
       </p:ext>
     </p:extLst>
   </p:cSld>

</xml_diff>

<commit_message>
Added Examples to PHP presentation
</commit_message>
<xml_diff>
--- a/04.php-basics.pptx
+++ b/04.php-basics.pptx
@@ -19,6 +19,10 @@
     <p:sldId id="267" r:id="rId13"/>
     <p:sldId id="268" r:id="rId14"/>
     <p:sldId id="269" r:id="rId15"/>
+    <p:sldId id="270" r:id="rId16"/>
+    <p:sldId id="271" r:id="rId17"/>
+    <p:sldId id="272" r:id="rId18"/>
+    <p:sldId id="273" r:id="rId19"/>
   </p:sldIdLst>
   <p:sldSz cx="12192000" cy="6858000"/>
   <p:notesSz cx="6858000" cy="9144000"/>
@@ -6755,6 +6759,363 @@
 </p:sld>
 </file>
 
+<file path=ppt/slides/slide15.xml><?xml version="1.0" encoding="utf-8"?>
+<p:sld xmlns:a="http://schemas.openxmlformats.org/drawingml/2006/main" xmlns:r="http://schemas.openxmlformats.org/officeDocument/2006/relationships" xmlns:p="http://schemas.openxmlformats.org/presentationml/2006/main">
+  <p:cSld>
+    <p:spTree>
+      <p:nvGrpSpPr>
+        <p:cNvPr id="1" name=""/>
+        <p:cNvGrpSpPr/>
+        <p:nvPr/>
+      </p:nvGrpSpPr>
+      <p:grpSpPr>
+        <a:xfrm>
+          <a:off x="0" y="0"/>
+          <a:ext cx="0" cy="0"/>
+          <a:chOff x="0" y="0"/>
+          <a:chExt cx="0" cy="0"/>
+        </a:xfrm>
+      </p:grpSpPr>
+      <p:sp>
+        <p:nvSpPr>
+          <p:cNvPr id="2" name="Title 1"/>
+          <p:cNvSpPr>
+            <a:spLocks noGrp="1"/>
+          </p:cNvSpPr>
+          <p:nvPr>
+            <p:ph type="title"/>
+          </p:nvPr>
+        </p:nvSpPr>
+        <p:spPr/>
+        <p:txBody>
+          <a:bodyPr/>
+          <a:lstStyle/>
+          <a:p>
+            <a:r>
+              <a:rPr lang="en-US" dirty="0" err="1" smtClean="0"/>
+              <a:t>pHP</a:t>
+            </a:r>
+            <a:r>
+              <a:rPr lang="en-US" dirty="0" smtClean="0"/>
+              <a:t> </a:t>
+            </a:r>
+            <a:r>
+              <a:rPr lang="bg-BG" dirty="0" smtClean="0"/>
+              <a:t>логически оператори</a:t>
+            </a:r>
+            <a:endParaRPr lang="en-US" dirty="0"/>
+          </a:p>
+        </p:txBody>
+      </p:sp>
+      <p:sp>
+        <p:nvSpPr>
+          <p:cNvPr id="3" name="Content Placeholder 2"/>
+          <p:cNvSpPr>
+            <a:spLocks noGrp="1"/>
+          </p:cNvSpPr>
+          <p:nvPr>
+            <p:ph sz="quarter" idx="13"/>
+          </p:nvPr>
+        </p:nvSpPr>
+        <p:spPr/>
+        <p:txBody>
+          <a:bodyPr/>
+          <a:lstStyle/>
+          <a:p>
+            <a:r>
+              <a:rPr lang="bg-BG" dirty="0" smtClean="0"/>
+              <a:t>Определят връзката между отделните проверки</a:t>
+            </a:r>
+          </a:p>
+          <a:p>
+            <a:r>
+              <a:rPr lang="bg-BG" dirty="0" smtClean="0"/>
+              <a:t>Логически оператор и</a:t>
+            </a:r>
+            <a:r>
+              <a:rPr lang="en-US" dirty="0" smtClean="0"/>
+              <a:t>: &amp;&amp;</a:t>
+            </a:r>
+            <a:endParaRPr lang="bg-BG" dirty="0" smtClean="0"/>
+          </a:p>
+          <a:p>
+            <a:r>
+              <a:rPr lang="bg-BG" dirty="0" smtClean="0"/>
+              <a:t>Логически оператор или: </a:t>
+            </a:r>
+            <a:r>
+              <a:rPr lang="en-US" dirty="0" smtClean="0"/>
+              <a:t>||</a:t>
+            </a:r>
+          </a:p>
+          <a:p>
+            <a:r>
+              <a:rPr lang="bg-BG" dirty="0" smtClean="0"/>
+              <a:t>Приоритет на операторите</a:t>
+            </a:r>
+          </a:p>
+          <a:p>
+            <a:r>
+              <a:rPr lang="bg-BG" dirty="0" smtClean="0"/>
+              <a:t>Скоби за определяне на приоритета</a:t>
+            </a:r>
+            <a:endParaRPr lang="en-US" dirty="0" smtClean="0"/>
+          </a:p>
+          <a:p>
+            <a:pPr marL="0" indent="0">
+              <a:buNone/>
+            </a:pPr>
+            <a:endParaRPr lang="bg-BG" dirty="0" smtClean="0"/>
+          </a:p>
+        </p:txBody>
+      </p:sp>
+    </p:spTree>
+    <p:extLst>
+      <p:ext uri="{BB962C8B-B14F-4D97-AF65-F5344CB8AC3E}">
+        <p14:creationId xmlns:p14="http://schemas.microsoft.com/office/powerpoint/2010/main" val="1243813299"/>
+      </p:ext>
+    </p:extLst>
+  </p:cSld>
+  <p:clrMapOvr>
+    <a:masterClrMapping/>
+  </p:clrMapOvr>
+</p:sld>
+</file>
+
+<file path=ppt/slides/slide16.xml><?xml version="1.0" encoding="utf-8"?>
+<p:sld xmlns:a="http://schemas.openxmlformats.org/drawingml/2006/main" xmlns:r="http://schemas.openxmlformats.org/officeDocument/2006/relationships" xmlns:p="http://schemas.openxmlformats.org/presentationml/2006/main">
+  <p:cSld>
+    <p:spTree>
+      <p:nvGrpSpPr>
+        <p:cNvPr id="1" name=""/>
+        <p:cNvGrpSpPr/>
+        <p:nvPr/>
+      </p:nvGrpSpPr>
+      <p:grpSpPr>
+        <a:xfrm>
+          <a:off x="0" y="0"/>
+          <a:ext cx="0" cy="0"/>
+          <a:chOff x="0" y="0"/>
+          <a:chExt cx="0" cy="0"/>
+        </a:xfrm>
+      </p:grpSpPr>
+      <p:sp>
+        <p:nvSpPr>
+          <p:cNvPr id="2" name="Title 1"/>
+          <p:cNvSpPr>
+            <a:spLocks noGrp="1"/>
+          </p:cNvSpPr>
+          <p:nvPr>
+            <p:ph type="title"/>
+          </p:nvPr>
+        </p:nvSpPr>
+        <p:spPr/>
+        <p:txBody>
+          <a:bodyPr/>
+          <a:lstStyle/>
+          <a:p>
+            <a:r>
+              <a:rPr lang="en-US" dirty="0" smtClean="0"/>
+              <a:t>PHP </a:t>
+            </a:r>
+            <a:r>
+              <a:rPr lang="bg-BG" dirty="0" smtClean="0"/>
+              <a:t>ЛОГИЧЕСКИ ОПЕРАТОРИ ДЕМО</a:t>
+            </a:r>
+            <a:endParaRPr lang="en-US" dirty="0"/>
+          </a:p>
+        </p:txBody>
+      </p:sp>
+      <p:pic>
+        <p:nvPicPr>
+          <p:cNvPr id="1026" name="Picture 2" descr="http://www.journaldev.com/wp-content/uploads/2013/07/php-operators.png"/>
+          <p:cNvPicPr>
+            <a:picLocks noChangeAspect="1" noChangeArrowheads="1"/>
+          </p:cNvPicPr>
+          <p:nvPr/>
+        </p:nvPicPr>
+        <p:blipFill>
+          <a:blip r:embed="rId2">
+            <a:extLst>
+              <a:ext uri="{28A0092B-C50C-407E-A947-70E740481C1C}">
+                <a14:useLocalDpi xmlns:a14="http://schemas.microsoft.com/office/drawing/2010/main" val="0"/>
+              </a:ext>
+            </a:extLst>
+          </a:blip>
+          <a:srcRect/>
+          <a:stretch>
+            <a:fillRect/>
+          </a:stretch>
+        </p:blipFill>
+        <p:spPr bwMode="auto">
+          <a:xfrm>
+            <a:off x="2756812" y="2214694"/>
+            <a:ext cx="6678375" cy="4036204"/>
+          </a:xfrm>
+          <a:prstGeom prst="rect">
+            <a:avLst/>
+          </a:prstGeom>
+          <a:noFill/>
+          <a:extLst>
+            <a:ext uri="{909E8E84-426E-40DD-AFC4-6F175D3DCCD1}">
+              <a14:hiddenFill xmlns:a14="http://schemas.microsoft.com/office/drawing/2010/main">
+                <a:solidFill>
+                  <a:srgbClr val="FFFFFF"/>
+                </a:solidFill>
+              </a14:hiddenFill>
+            </a:ext>
+          </a:extLst>
+        </p:spPr>
+      </p:pic>
+    </p:spTree>
+    <p:extLst>
+      <p:ext uri="{BB962C8B-B14F-4D97-AF65-F5344CB8AC3E}">
+        <p14:creationId xmlns:p14="http://schemas.microsoft.com/office/powerpoint/2010/main" val="109009952"/>
+      </p:ext>
+    </p:extLst>
+  </p:cSld>
+  <p:clrMapOvr>
+    <a:masterClrMapping/>
+  </p:clrMapOvr>
+</p:sld>
+</file>
+
+<file path=ppt/slides/slide17.xml><?xml version="1.0" encoding="utf-8"?>
+<p:sld xmlns:a="http://schemas.openxmlformats.org/drawingml/2006/main" xmlns:r="http://schemas.openxmlformats.org/officeDocument/2006/relationships" xmlns:p="http://schemas.openxmlformats.org/presentationml/2006/main">
+  <p:cSld>
+    <p:spTree>
+      <p:nvGrpSpPr>
+        <p:cNvPr id="1" name=""/>
+        <p:cNvGrpSpPr/>
+        <p:nvPr/>
+      </p:nvGrpSpPr>
+      <p:grpSpPr>
+        <a:xfrm>
+          <a:off x="0" y="0"/>
+          <a:ext cx="0" cy="0"/>
+          <a:chOff x="0" y="0"/>
+          <a:chExt cx="0" cy="0"/>
+        </a:xfrm>
+      </p:grpSpPr>
+      <p:sp>
+        <p:nvSpPr>
+          <p:cNvPr id="2" name="Title 1"/>
+          <p:cNvSpPr>
+            <a:spLocks noGrp="1"/>
+          </p:cNvSpPr>
+          <p:nvPr>
+            <p:ph type="title"/>
+          </p:nvPr>
+        </p:nvSpPr>
+        <p:spPr/>
+        <p:txBody>
+          <a:bodyPr/>
+          <a:lstStyle/>
+          <a:p>
+            <a:endParaRPr lang="en-US" dirty="0"/>
+          </a:p>
+        </p:txBody>
+      </p:sp>
+      <p:sp>
+        <p:nvSpPr>
+          <p:cNvPr id="3" name="Content Placeholder 2"/>
+          <p:cNvSpPr>
+            <a:spLocks noGrp="1"/>
+          </p:cNvSpPr>
+          <p:nvPr>
+            <p:ph sz="quarter" idx="13"/>
+          </p:nvPr>
+        </p:nvSpPr>
+        <p:spPr/>
+        <p:txBody>
+          <a:bodyPr/>
+          <a:lstStyle/>
+          <a:p>
+            <a:endParaRPr lang="en-US"/>
+          </a:p>
+        </p:txBody>
+      </p:sp>
+    </p:spTree>
+    <p:extLst>
+      <p:ext uri="{BB962C8B-B14F-4D97-AF65-F5344CB8AC3E}">
+        <p14:creationId xmlns:p14="http://schemas.microsoft.com/office/powerpoint/2010/main" val="3478786874"/>
+      </p:ext>
+    </p:extLst>
+  </p:cSld>
+  <p:clrMapOvr>
+    <a:masterClrMapping/>
+  </p:clrMapOvr>
+</p:sld>
+</file>
+
+<file path=ppt/slides/slide18.xml><?xml version="1.0" encoding="utf-8"?>
+<p:sld xmlns:a="http://schemas.openxmlformats.org/drawingml/2006/main" xmlns:r="http://schemas.openxmlformats.org/officeDocument/2006/relationships" xmlns:p="http://schemas.openxmlformats.org/presentationml/2006/main">
+  <p:cSld>
+    <p:spTree>
+      <p:nvGrpSpPr>
+        <p:cNvPr id="1" name=""/>
+        <p:cNvGrpSpPr/>
+        <p:nvPr/>
+      </p:nvGrpSpPr>
+      <p:grpSpPr>
+        <a:xfrm>
+          <a:off x="0" y="0"/>
+          <a:ext cx="0" cy="0"/>
+          <a:chOff x="0" y="0"/>
+          <a:chExt cx="0" cy="0"/>
+        </a:xfrm>
+      </p:grpSpPr>
+      <p:sp>
+        <p:nvSpPr>
+          <p:cNvPr id="2" name="Title 1"/>
+          <p:cNvSpPr>
+            <a:spLocks noGrp="1"/>
+          </p:cNvSpPr>
+          <p:nvPr>
+            <p:ph type="title"/>
+          </p:nvPr>
+        </p:nvSpPr>
+        <p:spPr/>
+        <p:txBody>
+          <a:bodyPr/>
+          <a:lstStyle/>
+          <a:p>
+            <a:endParaRPr lang="en-US"/>
+          </a:p>
+        </p:txBody>
+      </p:sp>
+      <p:sp>
+        <p:nvSpPr>
+          <p:cNvPr id="3" name="Content Placeholder 2"/>
+          <p:cNvSpPr>
+            <a:spLocks noGrp="1"/>
+          </p:cNvSpPr>
+          <p:nvPr>
+            <p:ph sz="quarter" idx="13"/>
+          </p:nvPr>
+        </p:nvSpPr>
+        <p:spPr/>
+        <p:txBody>
+          <a:bodyPr/>
+          <a:lstStyle/>
+          <a:p>
+            <a:endParaRPr lang="en-US"/>
+          </a:p>
+        </p:txBody>
+      </p:sp>
+    </p:spTree>
+    <p:extLst>
+      <p:ext uri="{BB962C8B-B14F-4D97-AF65-F5344CB8AC3E}">
+        <p14:creationId xmlns:p14="http://schemas.microsoft.com/office/powerpoint/2010/main" val="3309835595"/>
+      </p:ext>
+    </p:extLst>
+  </p:cSld>
+  <p:clrMapOvr>
+    <a:masterClrMapping/>
+  </p:clrMapOvr>
+</p:sld>
+</file>
+
 <file path=ppt/slides/slide2.xml><?xml version="1.0" encoding="utf-8"?>
 <p:sld xmlns:a="http://schemas.openxmlformats.org/drawingml/2006/main" xmlns:r="http://schemas.openxmlformats.org/officeDocument/2006/relationships" xmlns:p="http://schemas.openxmlformats.org/presentationml/2006/main">
   <p:cSld>
@@ -7382,28 +7743,18 @@
           <a:p>
             <a:r>
               <a:rPr lang="bg-BG" dirty="0" smtClean="0"/>
-              <a:t>Синтаксиса е </a:t>
-            </a:r>
+              <a:t>Синтаксиса е улеснен</a:t>
+            </a:r>
+          </a:p>
+          <a:p>
             <a:r>
               <a:rPr lang="bg-BG" dirty="0" smtClean="0"/>
-              <a:t>улеснен</a:t>
-            </a:r>
-            <a:endParaRPr lang="bg-BG" dirty="0" smtClean="0"/>
-          </a:p>
-          <a:p>
-            <a:r>
-              <a:rPr lang="bg-BG" dirty="0" smtClean="0"/>
-              <a:t>Синтаксиса е подобен на </a:t>
-            </a:r>
-            <a:r>
-              <a:rPr lang="bg-BG" dirty="0" smtClean="0"/>
-              <a:t>синтаксиса на езика </a:t>
+              <a:t>Синтаксиса е подобен на синтаксиса на езика </a:t>
             </a:r>
             <a:r>
               <a:rPr lang="en-US" dirty="0" smtClean="0"/>
               <a:t>C</a:t>
             </a:r>
-            <a:endParaRPr lang="en-US" dirty="0" smtClean="0"/>
           </a:p>
           <a:p>
             <a:r>
@@ -7419,11 +7770,7 @@
           <a:p>
             <a:r>
               <a:rPr lang="bg-BG" dirty="0" smtClean="0"/>
-              <a:t>КОМЕНТАРИ - //, /* </a:t>
-            </a:r>
-            <a:r>
-              <a:rPr lang="bg-BG" dirty="0" smtClean="0"/>
-              <a:t>*/, </a:t>
+              <a:t>КОМЕНТАРИ - //, /* */, </a:t>
             </a:r>
             <a:r>
               <a:rPr lang="en-US" dirty="0" smtClean="0"/>

</xml_diff>